<commit_message>
nouvelle version fichier presentation_vampire version 1
</commit_message>
<xml_diff>
--- a/conception/presentation/Presentation_teams_vampires.pptx
+++ b/conception/presentation/Presentation_teams_vampires.pptx
@@ -14,6 +14,7 @@
     <p:sldId id="268" r:id="rId8"/>
     <p:sldId id="269" r:id="rId9"/>
     <p:sldId id="270" r:id="rId10"/>
+    <p:sldId id="272" r:id="rId11"/>
   </p:sldIdLst>
   <p:sldSz cx="12192000" cy="6858000"/>
   <p:notesSz cx="6858000" cy="9144000"/>
@@ -114,7 +115,7 @@
   </p:defaultTextStyle>
   <p:extLst>
     <p:ext uri="{EFAFB233-063F-42B5-8137-9DF3F51BA10A}">
-      <p15:sldGuideLst xmlns="" xmlns:p15="http://schemas.microsoft.com/office/powerpoint/2012/main"/>
+      <p15:sldGuideLst xmlns:p15="http://schemas.microsoft.com/office/powerpoint/2012/main" xmlns=""/>
     </p:ext>
   </p:extLst>
 </p:presentation>
@@ -3276,7 +3277,7 @@
           <p:cNvPr id="2" name="Title 1">
             <a:extLst>
               <a:ext uri="{FF2B5EF4-FFF2-40B4-BE49-F238E27FC236}">
-                <a16:creationId xmlns="" xmlns:a16="http://schemas.microsoft.com/office/drawing/2014/main" id="{00A839E6-E2EC-FD43-9FEF-AB790772D9D3}"/>
+                <a16:creationId xmlns:a16="http://schemas.microsoft.com/office/drawing/2014/main" xmlns="" id="{00A839E6-E2EC-FD43-9FEF-AB790772D9D3}"/>
               </a:ext>
             </a:extLst>
           </p:cNvPr>
@@ -3304,7 +3305,7 @@
           <p:cNvPr id="3" name="Subtitle 2">
             <a:extLst>
               <a:ext uri="{FF2B5EF4-FFF2-40B4-BE49-F238E27FC236}">
-                <a16:creationId xmlns="" xmlns:a16="http://schemas.microsoft.com/office/drawing/2014/main" id="{F59E5260-A9D2-4C49-9B79-F7D511B31EBB}"/>
+                <a16:creationId xmlns:a16="http://schemas.microsoft.com/office/drawing/2014/main" xmlns="" id="{F59E5260-A9D2-4C49-9B79-F7D511B31EBB}"/>
               </a:ext>
             </a:extLst>
           </p:cNvPr>
@@ -3335,9 +3336,85 @@
     </p:spTree>
     <p:extLst>
       <p:ext uri="{BB962C8B-B14F-4D97-AF65-F5344CB8AC3E}">
-        <p14:creationId xmlns="" xmlns:p14="http://schemas.microsoft.com/office/powerpoint/2010/main" val="906894890"/>
+        <p14:creationId xmlns:p14="http://schemas.microsoft.com/office/powerpoint/2010/main" xmlns="" val="906894890"/>
       </p:ext>
     </p:extLst>
+  </p:cSld>
+  <p:clrMapOvr>
+    <a:masterClrMapping/>
+  </p:clrMapOvr>
+</p:sld>
+</file>
+
+<file path=ppt/slides/slide10.xml><?xml version="1.0" encoding="utf-8"?>
+<p:sld xmlns:a="http://schemas.openxmlformats.org/drawingml/2006/main" xmlns:r="http://schemas.openxmlformats.org/officeDocument/2006/relationships" xmlns:p="http://schemas.openxmlformats.org/presentationml/2006/main">
+  <p:cSld>
+    <p:spTree>
+      <p:nvGrpSpPr>
+        <p:cNvPr id="1" name=""/>
+        <p:cNvGrpSpPr/>
+        <p:nvPr/>
+      </p:nvGrpSpPr>
+      <p:grpSpPr>
+        <a:xfrm>
+          <a:off x="0" y="0"/>
+          <a:ext cx="0" cy="0"/>
+          <a:chOff x="0" y="0"/>
+          <a:chExt cx="0" cy="0"/>
+        </a:xfrm>
+      </p:grpSpPr>
+      <p:sp>
+        <p:nvSpPr>
+          <p:cNvPr id="2" name="Titre 1"/>
+          <p:cNvSpPr>
+            <a:spLocks noGrp="1"/>
+          </p:cNvSpPr>
+          <p:nvPr>
+            <p:ph type="title"/>
+          </p:nvPr>
+        </p:nvSpPr>
+        <p:spPr>
+          <a:xfrm>
+            <a:off x="2231136" y="0"/>
+            <a:ext cx="7729728" cy="1188720"/>
+          </a:xfrm>
+        </p:spPr>
+        <p:txBody>
+          <a:bodyPr/>
+          <a:lstStyle/>
+          <a:p>
+            <a:r>
+              <a:rPr lang="fr-FR" dirty="0" smtClean="0"/>
+              <a:t>Use case</a:t>
+            </a:r>
+            <a:endParaRPr lang="fr-FR" dirty="0"/>
+          </a:p>
+        </p:txBody>
+      </p:sp>
+      <p:pic>
+        <p:nvPicPr>
+          <p:cNvPr id="4" name="Espace réservé du contenu 3" descr="usecase.drawio.png"/>
+          <p:cNvPicPr>
+            <a:picLocks noGrp="1" noChangeAspect="1"/>
+          </p:cNvPicPr>
+          <p:nvPr>
+            <p:ph idx="1"/>
+          </p:nvPr>
+        </p:nvPicPr>
+        <p:blipFill>
+          <a:blip r:embed="rId2"/>
+          <a:stretch>
+            <a:fillRect/>
+          </a:stretch>
+        </p:blipFill>
+        <p:spPr>
+          <a:xfrm>
+            <a:off x="2231136" y="1404730"/>
+            <a:ext cx="7729728" cy="5234609"/>
+          </a:xfrm>
+        </p:spPr>
+      </p:pic>
+    </p:spTree>
   </p:cSld>
   <p:clrMapOvr>
     <a:masterClrMapping/>
@@ -3367,7 +3444,7 @@
           <p:cNvPr id="2" name="Title 1">
             <a:extLst>
               <a:ext uri="{FF2B5EF4-FFF2-40B4-BE49-F238E27FC236}">
-                <a16:creationId xmlns="" xmlns:a16="http://schemas.microsoft.com/office/drawing/2014/main" id="{9D96E17F-1028-D148-B189-83F9A4C1FE73}"/>
+                <a16:creationId xmlns:a16="http://schemas.microsoft.com/office/drawing/2014/main" xmlns="" id="{9D96E17F-1028-D148-B189-83F9A4C1FE73}"/>
               </a:ext>
             </a:extLst>
           </p:cNvPr>
@@ -3395,7 +3472,7 @@
           <p:cNvPr id="3" name="Content Placeholder 2">
             <a:extLst>
               <a:ext uri="{FF2B5EF4-FFF2-40B4-BE49-F238E27FC236}">
-                <a16:creationId xmlns="" xmlns:a16="http://schemas.microsoft.com/office/drawing/2014/main" id="{D3FD2D07-15CF-9040-A7E1-69E533E8A54C}"/>
+                <a16:creationId xmlns:a16="http://schemas.microsoft.com/office/drawing/2014/main" xmlns="" id="{D3FD2D07-15CF-9040-A7E1-69E533E8A54C}"/>
               </a:ext>
             </a:extLst>
           </p:cNvPr>
@@ -3449,7 +3526,7 @@
     </p:spTree>
     <p:extLst>
       <p:ext uri="{BB962C8B-B14F-4D97-AF65-F5344CB8AC3E}">
-        <p14:creationId xmlns="" xmlns:p14="http://schemas.microsoft.com/office/powerpoint/2010/main" val="4199062536"/>
+        <p14:creationId xmlns:p14="http://schemas.microsoft.com/office/powerpoint/2010/main" xmlns="" val="4199062536"/>
       </p:ext>
     </p:extLst>
   </p:cSld>
@@ -3561,7 +3638,7 @@
           <p:cNvPr id="2" name="Title 1">
             <a:extLst>
               <a:ext uri="{FF2B5EF4-FFF2-40B4-BE49-F238E27FC236}">
-                <a16:creationId xmlns="" xmlns:a16="http://schemas.microsoft.com/office/drawing/2014/main" id="{04780F8B-A673-5E46-B69D-90970069CAED}"/>
+                <a16:creationId xmlns:a16="http://schemas.microsoft.com/office/drawing/2014/main" xmlns="" id="{04780F8B-A673-5E46-B69D-90970069CAED}"/>
               </a:ext>
             </a:extLst>
           </p:cNvPr>
@@ -3594,7 +3671,7 @@
           <p:cNvPr id="5" name="Content Placeholder 4">
             <a:extLst>
               <a:ext uri="{FF2B5EF4-FFF2-40B4-BE49-F238E27FC236}">
-                <a16:creationId xmlns="" xmlns:a16="http://schemas.microsoft.com/office/drawing/2014/main" id="{C5BF60A7-1156-054E-B914-DC41B3F8E5BF}"/>
+                <a16:creationId xmlns:a16="http://schemas.microsoft.com/office/drawing/2014/main" xmlns="" id="{C5BF60A7-1156-054E-B914-DC41B3F8E5BF}"/>
               </a:ext>
             </a:extLst>
           </p:cNvPr>
@@ -3621,7 +3698,7 @@
     </p:spTree>
     <p:extLst>
       <p:ext uri="{BB962C8B-B14F-4D97-AF65-F5344CB8AC3E}">
-        <p14:creationId xmlns="" xmlns:p14="http://schemas.microsoft.com/office/powerpoint/2010/main" val="1414785773"/>
+        <p14:creationId xmlns:p14="http://schemas.microsoft.com/office/powerpoint/2010/main" xmlns="" val="1414785773"/>
       </p:ext>
     </p:extLst>
   </p:cSld>
@@ -3653,7 +3730,7 @@
           <p:cNvPr id="2" name="Title 1">
             <a:extLst>
               <a:ext uri="{FF2B5EF4-FFF2-40B4-BE49-F238E27FC236}">
-                <a16:creationId xmlns="" xmlns:a16="http://schemas.microsoft.com/office/drawing/2014/main" id="{86490BF1-B63B-7E45-941B-C9DD6BA8053B}"/>
+                <a16:creationId xmlns:a16="http://schemas.microsoft.com/office/drawing/2014/main" xmlns="" id="{86490BF1-B63B-7E45-941B-C9DD6BA8053B}"/>
               </a:ext>
             </a:extLst>
           </p:cNvPr>
@@ -3681,7 +3758,7 @@
           <p:cNvPr id="5" name="Content Placeholder 4">
             <a:extLst>
               <a:ext uri="{FF2B5EF4-FFF2-40B4-BE49-F238E27FC236}">
-                <a16:creationId xmlns="" xmlns:a16="http://schemas.microsoft.com/office/drawing/2014/main" id="{0CC6E7C7-0838-9743-8D64-CEE5334604AF}"/>
+                <a16:creationId xmlns:a16="http://schemas.microsoft.com/office/drawing/2014/main" xmlns="" id="{0CC6E7C7-0838-9743-8D64-CEE5334604AF}"/>
               </a:ext>
             </a:extLst>
           </p:cNvPr>
@@ -3708,7 +3785,7 @@
     </p:spTree>
     <p:extLst>
       <p:ext uri="{BB962C8B-B14F-4D97-AF65-F5344CB8AC3E}">
-        <p14:creationId xmlns="" xmlns:p14="http://schemas.microsoft.com/office/powerpoint/2010/main" val="52420283"/>
+        <p14:creationId xmlns:p14="http://schemas.microsoft.com/office/powerpoint/2010/main" xmlns="" val="52420283"/>
       </p:ext>
     </p:extLst>
   </p:cSld>
@@ -3740,7 +3817,7 @@
           <p:cNvPr id="2" name="Title 1">
             <a:extLst>
               <a:ext uri="{FF2B5EF4-FFF2-40B4-BE49-F238E27FC236}">
-                <a16:creationId xmlns="" xmlns:a16="http://schemas.microsoft.com/office/drawing/2014/main" id="{D5DA2DA2-12E1-0B4B-9682-3BF2AD26ED79}"/>
+                <a16:creationId xmlns:a16="http://schemas.microsoft.com/office/drawing/2014/main" xmlns="" id="{D5DA2DA2-12E1-0B4B-9682-3BF2AD26ED79}"/>
               </a:ext>
             </a:extLst>
           </p:cNvPr>
@@ -3765,7 +3842,7 @@
           <p:cNvPr id="3" name="Content Placeholder 2">
             <a:extLst>
               <a:ext uri="{FF2B5EF4-FFF2-40B4-BE49-F238E27FC236}">
-                <a16:creationId xmlns="" xmlns:a16="http://schemas.microsoft.com/office/drawing/2014/main" id="{11294F42-0770-7D4E-8762-4E1E0F59D5B0}"/>
+                <a16:creationId xmlns:a16="http://schemas.microsoft.com/office/drawing/2014/main" xmlns="" id="{11294F42-0770-7D4E-8762-4E1E0F59D5B0}"/>
               </a:ext>
             </a:extLst>
           </p:cNvPr>
@@ -3850,7 +3927,7 @@
     </p:spTree>
     <p:extLst>
       <p:ext uri="{BB962C8B-B14F-4D97-AF65-F5344CB8AC3E}">
-        <p14:creationId xmlns="" xmlns:p14="http://schemas.microsoft.com/office/powerpoint/2010/main" val="25530045"/>
+        <p14:creationId xmlns:p14="http://schemas.microsoft.com/office/powerpoint/2010/main" xmlns="" val="25530045"/>
       </p:ext>
     </p:extLst>
   </p:cSld>
@@ -3882,7 +3959,7 @@
           <p:cNvPr id="2" name="Title 1">
             <a:extLst>
               <a:ext uri="{FF2B5EF4-FFF2-40B4-BE49-F238E27FC236}">
-                <a16:creationId xmlns="" xmlns:a16="http://schemas.microsoft.com/office/drawing/2014/main" id="{F71E15BA-9FD1-BE46-8115-7C1BFF65ECD0}"/>
+                <a16:creationId xmlns:a16="http://schemas.microsoft.com/office/drawing/2014/main" xmlns="" id="{F71E15BA-9FD1-BE46-8115-7C1BFF65ECD0}"/>
               </a:ext>
             </a:extLst>
           </p:cNvPr>
@@ -3910,7 +3987,7 @@
           <p:cNvPr id="5" name="Content Placeholder 4">
             <a:extLst>
               <a:ext uri="{FF2B5EF4-FFF2-40B4-BE49-F238E27FC236}">
-                <a16:creationId xmlns="" xmlns:a16="http://schemas.microsoft.com/office/drawing/2014/main" id="{797B54F2-595C-194B-8F9D-DB6C9C375479}"/>
+                <a16:creationId xmlns:a16="http://schemas.microsoft.com/office/drawing/2014/main" xmlns="" id="{797B54F2-595C-194B-8F9D-DB6C9C375479}"/>
               </a:ext>
             </a:extLst>
           </p:cNvPr>
@@ -3937,7 +4014,7 @@
     </p:spTree>
     <p:extLst>
       <p:ext uri="{BB962C8B-B14F-4D97-AF65-F5344CB8AC3E}">
-        <p14:creationId xmlns="" xmlns:p14="http://schemas.microsoft.com/office/powerpoint/2010/main" val="1051359540"/>
+        <p14:creationId xmlns:p14="http://schemas.microsoft.com/office/powerpoint/2010/main" xmlns="" val="1051359540"/>
       </p:ext>
     </p:extLst>
   </p:cSld>
@@ -3969,7 +4046,7 @@
           <p:cNvPr id="2" name="Title 1">
             <a:extLst>
               <a:ext uri="{FF2B5EF4-FFF2-40B4-BE49-F238E27FC236}">
-                <a16:creationId xmlns="" xmlns:a16="http://schemas.microsoft.com/office/drawing/2014/main" id="{99DAFD96-A927-D249-B075-53A8E7C7B3E8}"/>
+                <a16:creationId xmlns:a16="http://schemas.microsoft.com/office/drawing/2014/main" xmlns="" id="{99DAFD96-A927-D249-B075-53A8E7C7B3E8}"/>
               </a:ext>
             </a:extLst>
           </p:cNvPr>
@@ -3997,7 +4074,7 @@
           <p:cNvPr id="5" name="Content Placeholder 4">
             <a:extLst>
               <a:ext uri="{FF2B5EF4-FFF2-40B4-BE49-F238E27FC236}">
-                <a16:creationId xmlns="" xmlns:a16="http://schemas.microsoft.com/office/drawing/2014/main" id="{18B913C3-54C3-6045-B017-9710E3E4B9DB}"/>
+                <a16:creationId xmlns:a16="http://schemas.microsoft.com/office/drawing/2014/main" xmlns="" id="{18B913C3-54C3-6045-B017-9710E3E4B9DB}"/>
               </a:ext>
             </a:extLst>
           </p:cNvPr>
@@ -4024,7 +4101,7 @@
     </p:spTree>
     <p:extLst>
       <p:ext uri="{BB962C8B-B14F-4D97-AF65-F5344CB8AC3E}">
-        <p14:creationId xmlns="" xmlns:p14="http://schemas.microsoft.com/office/powerpoint/2010/main" val="1850693521"/>
+        <p14:creationId xmlns:p14="http://schemas.microsoft.com/office/powerpoint/2010/main" xmlns="" val="1850693521"/>
       </p:ext>
     </p:extLst>
   </p:cSld>
@@ -4056,7 +4133,7 @@
           <p:cNvPr id="2" name="Title 1">
             <a:extLst>
               <a:ext uri="{FF2B5EF4-FFF2-40B4-BE49-F238E27FC236}">
-                <a16:creationId xmlns="" xmlns:a16="http://schemas.microsoft.com/office/drawing/2014/main" id="{B56CEA0A-458F-D24F-B519-06A124F4FBB1}"/>
+                <a16:creationId xmlns:a16="http://schemas.microsoft.com/office/drawing/2014/main" xmlns="" id="{B56CEA0A-458F-D24F-B519-06A124F4FBB1}"/>
               </a:ext>
             </a:extLst>
           </p:cNvPr>
@@ -4089,7 +4166,7 @@
           <p:cNvPr id="5" name="Content Placeholder 4">
             <a:extLst>
               <a:ext uri="{FF2B5EF4-FFF2-40B4-BE49-F238E27FC236}">
-                <a16:creationId xmlns="" xmlns:a16="http://schemas.microsoft.com/office/drawing/2014/main" id="{D48F51CF-F980-5541-A817-3747CE7D956A}"/>
+                <a16:creationId xmlns:a16="http://schemas.microsoft.com/office/drawing/2014/main" xmlns="" id="{D48F51CF-F980-5541-A817-3747CE7D956A}"/>
               </a:ext>
             </a:extLst>
           </p:cNvPr>
@@ -4116,7 +4193,7 @@
     </p:spTree>
     <p:extLst>
       <p:ext uri="{BB962C8B-B14F-4D97-AF65-F5344CB8AC3E}">
-        <p14:creationId xmlns="" xmlns:p14="http://schemas.microsoft.com/office/powerpoint/2010/main" val="1722852946"/>
+        <p14:creationId xmlns:p14="http://schemas.microsoft.com/office/powerpoint/2010/main" xmlns="" val="1722852946"/>
       </p:ext>
     </p:extLst>
   </p:cSld>
@@ -4380,7 +4457,7 @@
   <a:extraClrSchemeLst/>
   <a:extLst>
     <a:ext uri="{05A4C25C-085E-4340-85A3-A5531E510DB2}">
-      <thm15:themeFamily xmlns="" xmlns:thm15="http://schemas.microsoft.com/office/thememl/2012/main" name="Parcel" id="{8BEC4385-4EB9-4D53-BFB5-0EA123736B6D}" vid="{4DB32801-28C0-48B0-8C1D-A9A58613615A}"/>
+      <thm15:themeFamily xmlns:thm15="http://schemas.microsoft.com/office/thememl/2012/main" xmlns="" name="Parcel" id="{8BEC4385-4EB9-4D53-BFB5-0EA123736B6D}" vid="{4DB32801-28C0-48B0-8C1D-A9A58613615A}"/>
     </a:ext>
   </a:extLst>
 </a:theme>

</xml_diff>